<commit_message>
Slide for Assembler 3 and Prototype 1
</commit_message>
<xml_diff>
--- a/docs/presentation/Adversarial Physics.pptx
+++ b/docs/presentation/Adversarial Physics.pptx
@@ -2,7 +2,7 @@
 <file path=ppt/presentation.xml><?xml version="1.0" encoding="utf-8"?>
 <p:presentation xmlns:a="http://schemas.openxmlformats.org/drawingml/2006/main" xmlns:r="http://schemas.openxmlformats.org/officeDocument/2006/relationships" xmlns:p="http://schemas.openxmlformats.org/presentationml/2006/main" saveSubsetFonts="1">
   <p:sldMasterIdLst>
-    <p:sldMasterId id="2147483660" r:id="rId1"/>
+    <p:sldMasterId id="2147483678" r:id="rId1"/>
   </p:sldMasterIdLst>
   <p:sldIdLst>
     <p:sldId id="256" r:id="rId2"/>
@@ -10,12 +10,13 @@
     <p:sldId id="258" r:id="rId4"/>
     <p:sldId id="259" r:id="rId5"/>
     <p:sldId id="260" r:id="rId6"/>
-    <p:sldId id="261" r:id="rId7"/>
-    <p:sldId id="262" r:id="rId8"/>
-    <p:sldId id="264" r:id="rId9"/>
-    <p:sldId id="263" r:id="rId10"/>
-    <p:sldId id="266" r:id="rId11"/>
-    <p:sldId id="265" r:id="rId12"/>
+    <p:sldId id="267" r:id="rId7"/>
+    <p:sldId id="261" r:id="rId8"/>
+    <p:sldId id="262" r:id="rId9"/>
+    <p:sldId id="264" r:id="rId10"/>
+    <p:sldId id="263" r:id="rId11"/>
+    <p:sldId id="266" r:id="rId12"/>
+    <p:sldId id="265" r:id="rId13"/>
   </p:sldIdLst>
   <p:sldSz cx="12192000" cy="6858000"/>
   <p:notesSz cx="6858000" cy="9144000"/>
@@ -453,7 +454,7 @@
           <a:p>
             <a:fld id="{3B2A5283-7735-4F71-866F-6044CB3B49AE}" type="datetimeFigureOut">
               <a:rPr lang="en-GB" smtClean="0"/>
-              <a:t>31/01/2017</a:t>
+              <a:t>01/02/2017</a:t>
             </a:fld>
             <a:endParaRPr lang="en-GB"/>
           </a:p>
@@ -544,7 +545,7 @@
     </p:spTree>
     <p:extLst>
       <p:ext uri="{BB962C8B-B14F-4D97-AF65-F5344CB8AC3E}">
-        <p14:creationId xmlns:p14="http://schemas.microsoft.com/office/powerpoint/2010/main" val="3288802037"/>
+        <p14:creationId xmlns:p14="http://schemas.microsoft.com/office/powerpoint/2010/main" val="1778306858"/>
       </p:ext>
     </p:extLst>
   </p:cSld>
@@ -777,7 +778,7 @@
           <a:p>
             <a:fld id="{3B2A5283-7735-4F71-866F-6044CB3B49AE}" type="datetimeFigureOut">
               <a:rPr lang="en-GB" smtClean="0"/>
-              <a:t>31/01/2017</a:t>
+              <a:t>01/02/2017</a:t>
             </a:fld>
             <a:endParaRPr lang="en-GB"/>
           </a:p>
@@ -828,7 +829,7 @@
     </p:spTree>
     <p:extLst>
       <p:ext uri="{BB962C8B-B14F-4D97-AF65-F5344CB8AC3E}">
-        <p14:creationId xmlns:p14="http://schemas.microsoft.com/office/powerpoint/2010/main" val="2789810192"/>
+        <p14:creationId xmlns:p14="http://schemas.microsoft.com/office/powerpoint/2010/main" val="2859093424"/>
       </p:ext>
     </p:extLst>
   </p:cSld>
@@ -1025,7 +1026,7 @@
           <a:p>
             <a:fld id="{3B2A5283-7735-4F71-866F-6044CB3B49AE}" type="datetimeFigureOut">
               <a:rPr lang="en-GB" smtClean="0"/>
-              <a:t>31/01/2017</a:t>
+              <a:t>01/02/2017</a:t>
             </a:fld>
             <a:endParaRPr lang="en-GB"/>
           </a:p>
@@ -1107,7 +1108,7 @@
     </p:spTree>
     <p:extLst>
       <p:ext uri="{BB962C8B-B14F-4D97-AF65-F5344CB8AC3E}">
-        <p14:creationId xmlns:p14="http://schemas.microsoft.com/office/powerpoint/2010/main" val="1930152396"/>
+        <p14:creationId xmlns:p14="http://schemas.microsoft.com/office/powerpoint/2010/main" val="3160051447"/>
       </p:ext>
     </p:extLst>
   </p:cSld>
@@ -1364,7 +1365,7 @@
           <a:p>
             <a:fld id="{3B2A5283-7735-4F71-866F-6044CB3B49AE}" type="datetimeFigureOut">
               <a:rPr lang="en-GB" smtClean="0"/>
-              <a:t>31/01/2017</a:t>
+              <a:t>01/02/2017</a:t>
             </a:fld>
             <a:endParaRPr lang="en-GB"/>
           </a:p>
@@ -1514,7 +1515,7 @@
     </p:spTree>
     <p:extLst>
       <p:ext uri="{BB962C8B-B14F-4D97-AF65-F5344CB8AC3E}">
-        <p14:creationId xmlns:p14="http://schemas.microsoft.com/office/powerpoint/2010/main" val="4241836561"/>
+        <p14:creationId xmlns:p14="http://schemas.microsoft.com/office/powerpoint/2010/main" val="96309058"/>
       </p:ext>
     </p:extLst>
   </p:cSld>
@@ -1711,7 +1712,7 @@
           <a:p>
             <a:fld id="{3B2A5283-7735-4F71-866F-6044CB3B49AE}" type="datetimeFigureOut">
               <a:rPr lang="en-GB" smtClean="0"/>
-              <a:t>31/01/2017</a:t>
+              <a:t>01/02/2017</a:t>
             </a:fld>
             <a:endParaRPr lang="en-GB"/>
           </a:p>
@@ -1762,7 +1763,7 @@
     </p:spTree>
     <p:extLst>
       <p:ext uri="{BB962C8B-B14F-4D97-AF65-F5344CB8AC3E}">
-        <p14:creationId xmlns:p14="http://schemas.microsoft.com/office/powerpoint/2010/main" val="2021115313"/>
+        <p14:creationId xmlns:p14="http://schemas.microsoft.com/office/powerpoint/2010/main" val="2886915491"/>
       </p:ext>
     </p:extLst>
   </p:cSld>
@@ -2085,7 +2086,7 @@
           <a:p>
             <a:fld id="{3B2A5283-7735-4F71-866F-6044CB3B49AE}" type="datetimeFigureOut">
               <a:rPr lang="en-GB" smtClean="0"/>
-              <a:t>31/01/2017</a:t>
+              <a:t>01/02/2017</a:t>
             </a:fld>
             <a:endParaRPr lang="en-GB"/>
           </a:p>
@@ -2235,7 +2236,7 @@
     </p:spTree>
     <p:extLst>
       <p:ext uri="{BB962C8B-B14F-4D97-AF65-F5344CB8AC3E}">
-        <p14:creationId xmlns:p14="http://schemas.microsoft.com/office/powerpoint/2010/main" val="2502706445"/>
+        <p14:creationId xmlns:p14="http://schemas.microsoft.com/office/powerpoint/2010/main" val="314685201"/>
       </p:ext>
     </p:extLst>
   </p:cSld>
@@ -2555,7 +2556,7 @@
           <a:p>
             <a:fld id="{3B2A5283-7735-4F71-866F-6044CB3B49AE}" type="datetimeFigureOut">
               <a:rPr lang="en-GB" smtClean="0"/>
-              <a:t>31/01/2017</a:t>
+              <a:t>01/02/2017</a:t>
             </a:fld>
             <a:endParaRPr lang="en-GB"/>
           </a:p>
@@ -2637,7 +2638,7 @@
     </p:spTree>
     <p:extLst>
       <p:ext uri="{BB962C8B-B14F-4D97-AF65-F5344CB8AC3E}">
-        <p14:creationId xmlns:p14="http://schemas.microsoft.com/office/powerpoint/2010/main" val="1320024246"/>
+        <p14:creationId xmlns:p14="http://schemas.microsoft.com/office/powerpoint/2010/main" val="1302123249"/>
       </p:ext>
     </p:extLst>
   </p:cSld>
@@ -2760,7 +2761,7 @@
           <a:p>
             <a:fld id="{3B2A5283-7735-4F71-866F-6044CB3B49AE}" type="datetimeFigureOut">
               <a:rPr lang="en-GB" smtClean="0"/>
-              <a:t>31/01/2017</a:t>
+              <a:t>01/02/2017</a:t>
             </a:fld>
             <a:endParaRPr lang="en-GB"/>
           </a:p>
@@ -2842,7 +2843,7 @@
     </p:spTree>
     <p:extLst>
       <p:ext uri="{BB962C8B-B14F-4D97-AF65-F5344CB8AC3E}">
-        <p14:creationId xmlns:p14="http://schemas.microsoft.com/office/powerpoint/2010/main" val="3402582229"/>
+        <p14:creationId xmlns:p14="http://schemas.microsoft.com/office/powerpoint/2010/main" val="1345231066"/>
       </p:ext>
     </p:extLst>
   </p:cSld>
@@ -2971,7 +2972,7 @@
           <a:p>
             <a:fld id="{3B2A5283-7735-4F71-866F-6044CB3B49AE}" type="datetimeFigureOut">
               <a:rPr lang="en-GB" smtClean="0"/>
-              <a:t>31/01/2017</a:t>
+              <a:t>01/02/2017</a:t>
             </a:fld>
             <a:endParaRPr lang="en-GB"/>
           </a:p>
@@ -3053,7 +3054,7 @@
     </p:spTree>
     <p:extLst>
       <p:ext uri="{BB962C8B-B14F-4D97-AF65-F5344CB8AC3E}">
-        <p14:creationId xmlns:p14="http://schemas.microsoft.com/office/powerpoint/2010/main" val="301691120"/>
+        <p14:creationId xmlns:p14="http://schemas.microsoft.com/office/powerpoint/2010/main" val="3608400837"/>
       </p:ext>
     </p:extLst>
   </p:cSld>
@@ -3203,7 +3204,7 @@
           <a:p>
             <a:fld id="{3B2A5283-7735-4F71-866F-6044CB3B49AE}" type="datetimeFigureOut">
               <a:rPr lang="en-GB" smtClean="0"/>
-              <a:t>31/01/2017</a:t>
+              <a:t>01/02/2017</a:t>
             </a:fld>
             <a:endParaRPr lang="en-GB"/>
           </a:p>
@@ -3254,7 +3255,7 @@
     </p:spTree>
     <p:extLst>
       <p:ext uri="{BB962C8B-B14F-4D97-AF65-F5344CB8AC3E}">
-        <p14:creationId xmlns:p14="http://schemas.microsoft.com/office/powerpoint/2010/main" val="2963068099"/>
+        <p14:creationId xmlns:p14="http://schemas.microsoft.com/office/powerpoint/2010/main" val="2100455203"/>
       </p:ext>
     </p:extLst>
   </p:cSld>
@@ -3451,7 +3452,7 @@
           <a:p>
             <a:fld id="{3B2A5283-7735-4F71-866F-6044CB3B49AE}" type="datetimeFigureOut">
               <a:rPr lang="en-GB" smtClean="0"/>
-              <a:t>31/01/2017</a:t>
+              <a:t>01/02/2017</a:t>
             </a:fld>
             <a:endParaRPr lang="en-GB"/>
           </a:p>
@@ -3533,7 +3534,7 @@
     </p:spTree>
     <p:extLst>
       <p:ext uri="{BB962C8B-B14F-4D97-AF65-F5344CB8AC3E}">
-        <p14:creationId xmlns:p14="http://schemas.microsoft.com/office/powerpoint/2010/main" val="1348912678"/>
+        <p14:creationId xmlns:p14="http://schemas.microsoft.com/office/powerpoint/2010/main" val="941569122"/>
       </p:ext>
     </p:extLst>
   </p:cSld>
@@ -3749,7 +3750,7 @@
           <a:p>
             <a:fld id="{3B2A5283-7735-4F71-866F-6044CB3B49AE}" type="datetimeFigureOut">
               <a:rPr lang="en-GB" smtClean="0"/>
-              <a:t>31/01/2017</a:t>
+              <a:t>01/02/2017</a:t>
             </a:fld>
             <a:endParaRPr lang="en-GB"/>
           </a:p>
@@ -3800,7 +3801,7 @@
     </p:spTree>
     <p:extLst>
       <p:ext uri="{BB962C8B-B14F-4D97-AF65-F5344CB8AC3E}">
-        <p14:creationId xmlns:p14="http://schemas.microsoft.com/office/powerpoint/2010/main" val="386437532"/>
+        <p14:creationId xmlns:p14="http://schemas.microsoft.com/office/powerpoint/2010/main" val="1536736093"/>
       </p:ext>
     </p:extLst>
   </p:cSld>
@@ -4143,7 +4144,7 @@
           <a:p>
             <a:fld id="{3B2A5283-7735-4F71-866F-6044CB3B49AE}" type="datetimeFigureOut">
               <a:rPr lang="en-GB" smtClean="0"/>
-              <a:t>31/01/2017</a:t>
+              <a:t>01/02/2017</a:t>
             </a:fld>
             <a:endParaRPr lang="en-GB"/>
           </a:p>
@@ -4225,7 +4226,7 @@
     </p:spTree>
     <p:extLst>
       <p:ext uri="{BB962C8B-B14F-4D97-AF65-F5344CB8AC3E}">
-        <p14:creationId xmlns:p14="http://schemas.microsoft.com/office/powerpoint/2010/main" val="3542454714"/>
+        <p14:creationId xmlns:p14="http://schemas.microsoft.com/office/powerpoint/2010/main" val="1153363616"/>
       </p:ext>
     </p:extLst>
   </p:cSld>
@@ -4292,7 +4293,7 @@
           <a:p>
             <a:fld id="{3B2A5283-7735-4F71-866F-6044CB3B49AE}" type="datetimeFigureOut">
               <a:rPr lang="en-GB" smtClean="0"/>
-              <a:t>31/01/2017</a:t>
+              <a:t>01/02/2017</a:t>
             </a:fld>
             <a:endParaRPr lang="en-GB"/>
           </a:p>
@@ -4374,7 +4375,7 @@
     </p:spTree>
     <p:extLst>
       <p:ext uri="{BB962C8B-B14F-4D97-AF65-F5344CB8AC3E}">
-        <p14:creationId xmlns:p14="http://schemas.microsoft.com/office/powerpoint/2010/main" val="2977200848"/>
+        <p14:creationId xmlns:p14="http://schemas.microsoft.com/office/powerpoint/2010/main" val="413016396"/>
       </p:ext>
     </p:extLst>
   </p:cSld>
@@ -4418,7 +4419,7 @@
           <a:p>
             <a:fld id="{3B2A5283-7735-4F71-866F-6044CB3B49AE}" type="datetimeFigureOut">
               <a:rPr lang="en-GB" smtClean="0"/>
-              <a:t>31/01/2017</a:t>
+              <a:t>01/02/2017</a:t>
             </a:fld>
             <a:endParaRPr lang="en-GB"/>
           </a:p>
@@ -4469,7 +4470,7 @@
     </p:spTree>
     <p:extLst>
       <p:ext uri="{BB962C8B-B14F-4D97-AF65-F5344CB8AC3E}">
-        <p14:creationId xmlns:p14="http://schemas.microsoft.com/office/powerpoint/2010/main" val="1904811859"/>
+        <p14:creationId xmlns:p14="http://schemas.microsoft.com/office/powerpoint/2010/main" val="2810171507"/>
       </p:ext>
     </p:extLst>
   </p:cSld>
@@ -4673,7 +4674,7 @@
           <a:p>
             <a:fld id="{3B2A5283-7735-4F71-866F-6044CB3B49AE}" type="datetimeFigureOut">
               <a:rPr lang="en-GB" smtClean="0"/>
-              <a:t>31/01/2017</a:t>
+              <a:t>01/02/2017</a:t>
             </a:fld>
             <a:endParaRPr lang="en-GB"/>
           </a:p>
@@ -4755,7 +4756,7 @@
     </p:spTree>
     <p:extLst>
       <p:ext uri="{BB962C8B-B14F-4D97-AF65-F5344CB8AC3E}">
-        <p14:creationId xmlns:p14="http://schemas.microsoft.com/office/powerpoint/2010/main" val="63988070"/>
+        <p14:creationId xmlns:p14="http://schemas.microsoft.com/office/powerpoint/2010/main" val="1919135842"/>
       </p:ext>
     </p:extLst>
   </p:cSld>
@@ -4988,7 +4989,7 @@
           <a:p>
             <a:fld id="{3B2A5283-7735-4F71-866F-6044CB3B49AE}" type="datetimeFigureOut">
               <a:rPr lang="en-GB" smtClean="0"/>
-              <a:t>31/01/2017</a:t>
+              <a:t>01/02/2017</a:t>
             </a:fld>
             <a:endParaRPr lang="en-GB"/>
           </a:p>
@@ -5039,7 +5040,7 @@
     </p:spTree>
     <p:extLst>
       <p:ext uri="{BB962C8B-B14F-4D97-AF65-F5344CB8AC3E}">
-        <p14:creationId xmlns:p14="http://schemas.microsoft.com/office/powerpoint/2010/main" val="2771960281"/>
+        <p14:creationId xmlns:p14="http://schemas.microsoft.com/office/powerpoint/2010/main" val="1688670229"/>
       </p:ext>
     </p:extLst>
   </p:cSld>
@@ -5339,7 +5340,7 @@
           <a:p>
             <a:fld id="{3B2A5283-7735-4F71-866F-6044CB3B49AE}" type="datetimeFigureOut">
               <a:rPr lang="en-GB" smtClean="0"/>
-              <a:t>31/01/2017</a:t>
+              <a:t>01/02/2017</a:t>
             </a:fld>
             <a:endParaRPr lang="en-GB"/>
           </a:p>
@@ -5426,29 +5427,29 @@
     </p:spTree>
     <p:extLst>
       <p:ext uri="{BB962C8B-B14F-4D97-AF65-F5344CB8AC3E}">
-        <p14:creationId xmlns:p14="http://schemas.microsoft.com/office/powerpoint/2010/main" val="478883402"/>
+        <p14:creationId xmlns:p14="http://schemas.microsoft.com/office/powerpoint/2010/main" val="760300317"/>
       </p:ext>
     </p:extLst>
   </p:cSld>
   <p:clrMap bg1="lt1" tx1="dk1" bg2="lt2" tx2="dk2" accent1="accent1" accent2="accent2" accent3="accent3" accent4="accent4" accent5="accent5" accent6="accent6" hlink="hlink" folHlink="folHlink"/>
   <p:sldLayoutIdLst>
-    <p:sldLayoutId id="2147483661" r:id="rId1"/>
-    <p:sldLayoutId id="2147483662" r:id="rId2"/>
-    <p:sldLayoutId id="2147483663" r:id="rId3"/>
-    <p:sldLayoutId id="2147483664" r:id="rId4"/>
-    <p:sldLayoutId id="2147483665" r:id="rId5"/>
-    <p:sldLayoutId id="2147483666" r:id="rId6"/>
-    <p:sldLayoutId id="2147483667" r:id="rId7"/>
-    <p:sldLayoutId id="2147483668" r:id="rId8"/>
-    <p:sldLayoutId id="2147483669" r:id="rId9"/>
-    <p:sldLayoutId id="2147483670" r:id="rId10"/>
-    <p:sldLayoutId id="2147483671" r:id="rId11"/>
-    <p:sldLayoutId id="2147483672" r:id="rId12"/>
-    <p:sldLayoutId id="2147483673" r:id="rId13"/>
-    <p:sldLayoutId id="2147483674" r:id="rId14"/>
-    <p:sldLayoutId id="2147483675" r:id="rId15"/>
-    <p:sldLayoutId id="2147483676" r:id="rId16"/>
-    <p:sldLayoutId id="2147483677" r:id="rId17"/>
+    <p:sldLayoutId id="2147483679" r:id="rId1"/>
+    <p:sldLayoutId id="2147483680" r:id="rId2"/>
+    <p:sldLayoutId id="2147483681" r:id="rId3"/>
+    <p:sldLayoutId id="2147483682" r:id="rId4"/>
+    <p:sldLayoutId id="2147483683" r:id="rId5"/>
+    <p:sldLayoutId id="2147483684" r:id="rId6"/>
+    <p:sldLayoutId id="2147483685" r:id="rId7"/>
+    <p:sldLayoutId id="2147483686" r:id="rId8"/>
+    <p:sldLayoutId id="2147483687" r:id="rId9"/>
+    <p:sldLayoutId id="2147483688" r:id="rId10"/>
+    <p:sldLayoutId id="2147483689" r:id="rId11"/>
+    <p:sldLayoutId id="2147483690" r:id="rId12"/>
+    <p:sldLayoutId id="2147483691" r:id="rId13"/>
+    <p:sldLayoutId id="2147483692" r:id="rId14"/>
+    <p:sldLayoutId id="2147483693" r:id="rId15"/>
+    <p:sldLayoutId id="2147483694" r:id="rId16"/>
+    <p:sldLayoutId id="2147483695" r:id="rId17"/>
   </p:sldLayoutIdLst>
   <p:txStyles>
     <p:titleStyle>
@@ -5987,7 +5988,7 @@
           <a:p>
             <a:r>
               <a:rPr lang="en-GB" dirty="0"/>
-              <a:t>Conclusion</a:t>
+              <a:t>Prototype 3</a:t>
             </a:r>
           </a:p>
         </p:txBody>
@@ -6014,7 +6015,7 @@
     </p:spTree>
     <p:extLst>
       <p:ext uri="{BB962C8B-B14F-4D97-AF65-F5344CB8AC3E}">
-        <p14:creationId xmlns:p14="http://schemas.microsoft.com/office/powerpoint/2010/main" val="604119946"/>
+        <p14:creationId xmlns:p14="http://schemas.microsoft.com/office/powerpoint/2010/main" val="1402690200"/>
       </p:ext>
     </p:extLst>
   </p:cSld>
@@ -6051,12 +6052,78 @@
             <p:ph type="title"/>
           </p:nvPr>
         </p:nvSpPr>
-        <p:spPr>
-          <a:xfrm>
-            <a:off x="1295402" y="982132"/>
-            <a:ext cx="9601196" cy="1303867"/>
-          </a:xfrm>
-        </p:spPr>
+        <p:spPr/>
+        <p:txBody>
+          <a:bodyPr/>
+          <a:lstStyle/>
+          <a:p>
+            <a:r>
+              <a:rPr lang="en-GB" dirty="0"/>
+              <a:t>Conclusion</a:t>
+            </a:r>
+          </a:p>
+        </p:txBody>
+      </p:sp>
+      <p:sp>
+        <p:nvSpPr>
+          <p:cNvPr id="3" name="Content Placeholder 2"/>
+          <p:cNvSpPr>
+            <a:spLocks noGrp="1"/>
+          </p:cNvSpPr>
+          <p:nvPr>
+            <p:ph idx="1"/>
+          </p:nvPr>
+        </p:nvSpPr>
+        <p:spPr/>
+        <p:txBody>
+          <a:bodyPr/>
+          <a:lstStyle/>
+          <a:p>
+            <a:endParaRPr lang="en-GB"/>
+          </a:p>
+        </p:txBody>
+      </p:sp>
+    </p:spTree>
+    <p:extLst>
+      <p:ext uri="{BB962C8B-B14F-4D97-AF65-F5344CB8AC3E}">
+        <p14:creationId xmlns:p14="http://schemas.microsoft.com/office/powerpoint/2010/main" val="604119946"/>
+      </p:ext>
+    </p:extLst>
+  </p:cSld>
+  <p:clrMapOvr>
+    <a:masterClrMapping/>
+  </p:clrMapOvr>
+</p:sld>
+</file>
+
+<file path=ppt/slides/slide12.xml><?xml version="1.0" encoding="utf-8"?>
+<p:sld xmlns:a="http://schemas.openxmlformats.org/drawingml/2006/main" xmlns:r="http://schemas.openxmlformats.org/officeDocument/2006/relationships" xmlns:p="http://schemas.openxmlformats.org/presentationml/2006/main">
+  <p:cSld>
+    <p:spTree>
+      <p:nvGrpSpPr>
+        <p:cNvPr id="1" name=""/>
+        <p:cNvGrpSpPr/>
+        <p:nvPr/>
+      </p:nvGrpSpPr>
+      <p:grpSpPr>
+        <a:xfrm>
+          <a:off x="0" y="0"/>
+          <a:ext cx="0" cy="0"/>
+          <a:chOff x="0" y="0"/>
+          <a:chExt cx="0" cy="0"/>
+        </a:xfrm>
+      </p:grpSpPr>
+      <p:sp>
+        <p:nvSpPr>
+          <p:cNvPr id="2" name="Title 1"/>
+          <p:cNvSpPr>
+            <a:spLocks noGrp="1"/>
+          </p:cNvSpPr>
+          <p:nvPr>
+            <p:ph type="title"/>
+          </p:nvPr>
+        </p:nvSpPr>
+        <p:spPr/>
         <p:txBody>
           <a:bodyPr/>
           <a:lstStyle/>
@@ -6098,93 +6165,6 @@
           <a:chExt cx="0" cy="0"/>
         </a:xfrm>
       </p:grpSpPr>
-      <p:sp>
-        <p:nvSpPr>
-          <p:cNvPr id="2" name="Title 1"/>
-          <p:cNvSpPr>
-            <a:spLocks noGrp="1"/>
-          </p:cNvSpPr>
-          <p:nvPr>
-            <p:ph type="title"/>
-          </p:nvPr>
-        </p:nvSpPr>
-        <p:spPr/>
-        <p:txBody>
-          <a:bodyPr/>
-          <a:lstStyle/>
-          <a:p>
-            <a:r>
-              <a:rPr lang="en-GB" dirty="0"/>
-              <a:t>OLO</a:t>
-            </a:r>
-          </a:p>
-        </p:txBody>
-      </p:sp>
-      <p:sp>
-        <p:nvSpPr>
-          <p:cNvPr id="3" name="Content Placeholder 2"/>
-          <p:cNvSpPr>
-            <a:spLocks noGrp="1"/>
-          </p:cNvSpPr>
-          <p:nvPr>
-            <p:ph idx="1"/>
-          </p:nvPr>
-        </p:nvSpPr>
-        <p:spPr/>
-        <p:txBody>
-          <a:bodyPr>
-            <a:normAutofit lnSpcReduction="10000"/>
-          </a:bodyPr>
-          <a:lstStyle/>
-          <a:p>
-            <a:r>
-              <a:rPr lang="en-GB" dirty="0"/>
-              <a:t>Trial and error</a:t>
-            </a:r>
-          </a:p>
-          <a:p>
-            <a:r>
-              <a:rPr lang="en-GB" dirty="0"/>
-              <a:t>Bouncing/ </a:t>
-            </a:r>
-            <a:r>
-              <a:rPr lang="en-GB" dirty="0" err="1"/>
-              <a:t>Richocet</a:t>
-            </a:r>
-            <a:endParaRPr lang="en-GB" dirty="0"/>
-          </a:p>
-          <a:p>
-            <a:r>
-              <a:rPr lang="en-GB" dirty="0"/>
-              <a:t>Game of skill</a:t>
-            </a:r>
-          </a:p>
-          <a:p>
-            <a:r>
-              <a:rPr lang="en-GB" dirty="0"/>
-              <a:t>Strategy</a:t>
-            </a:r>
-          </a:p>
-          <a:p>
-            <a:r>
-              <a:rPr lang="en-GB" dirty="0"/>
-              <a:t>Fast</a:t>
-            </a:r>
-          </a:p>
-          <a:p>
-            <a:r>
-              <a:rPr lang="en-GB" dirty="0"/>
-              <a:t>Turn based</a:t>
-            </a:r>
-          </a:p>
-          <a:p>
-            <a:r>
-              <a:rPr lang="en-GB" dirty="0"/>
-              <a:t>Simple controls</a:t>
-            </a:r>
-          </a:p>
-        </p:txBody>
-      </p:sp>
       <p:pic>
         <p:nvPicPr>
           <p:cNvPr id="4" name="Picture 3"/>
@@ -6201,19 +6181,129 @@
               </a:ext>
             </a:extLst>
           </a:blip>
-          <a:srcRect l="26393" r="26358"/>
+          <a:srcRect l="15937" r="21195"/>
           <a:stretch/>
         </p:blipFill>
         <p:spPr>
           <a:xfrm>
-            <a:off x="5831753" y="2529461"/>
-            <a:ext cx="3022563" cy="3593154"/>
+            <a:off x="5418668" y="982131"/>
+            <a:ext cx="5469466" cy="4893735"/>
           </a:xfrm>
           <a:prstGeom prst="rect">
             <a:avLst/>
           </a:prstGeom>
+          <a:ln w="57150" cmpd="thickThin">
+            <a:solidFill>
+              <a:schemeClr val="tx1">
+                <a:lumMod val="50000"/>
+                <a:lumOff val="50000"/>
+              </a:schemeClr>
+            </a:solidFill>
+            <a:miter lim="800000"/>
+          </a:ln>
         </p:spPr>
       </p:pic>
+      <p:sp>
+        <p:nvSpPr>
+          <p:cNvPr id="2" name="Title 1"/>
+          <p:cNvSpPr>
+            <a:spLocks noGrp="1"/>
+          </p:cNvSpPr>
+          <p:nvPr>
+            <p:ph type="title"/>
+          </p:nvPr>
+        </p:nvSpPr>
+        <p:spPr>
+          <a:xfrm>
+            <a:off x="1295402" y="982132"/>
+            <a:ext cx="3660056" cy="1325373"/>
+          </a:xfrm>
+        </p:spPr>
+        <p:txBody>
+          <a:bodyPr anchor="b">
+            <a:normAutofit/>
+          </a:bodyPr>
+          <a:lstStyle/>
+          <a:p>
+            <a:r>
+              <a:rPr lang="en-GB" sz="2400"/>
+              <a:t>OLO</a:t>
+            </a:r>
+          </a:p>
+        </p:txBody>
+      </p:sp>
+      <p:sp>
+        <p:nvSpPr>
+          <p:cNvPr id="3" name="Content Placeholder 2"/>
+          <p:cNvSpPr>
+            <a:spLocks noGrp="1"/>
+          </p:cNvSpPr>
+          <p:nvPr>
+            <p:ph idx="1"/>
+          </p:nvPr>
+        </p:nvSpPr>
+        <p:spPr>
+          <a:xfrm>
+            <a:off x="1295401" y="2493774"/>
+            <a:ext cx="3660057" cy="3382094"/>
+          </a:xfrm>
+        </p:spPr>
+        <p:txBody>
+          <a:bodyPr>
+            <a:normAutofit/>
+          </a:bodyPr>
+          <a:lstStyle/>
+          <a:p>
+            <a:pPr algn="ctr"/>
+            <a:r>
+              <a:rPr lang="en-GB" sz="1600"/>
+              <a:t>Trial and error</a:t>
+            </a:r>
+          </a:p>
+          <a:p>
+            <a:pPr algn="ctr"/>
+            <a:r>
+              <a:rPr lang="en-GB" sz="1600"/>
+              <a:t>Bouncing/ Richocet</a:t>
+            </a:r>
+          </a:p>
+          <a:p>
+            <a:pPr algn="ctr"/>
+            <a:r>
+              <a:rPr lang="en-GB" sz="1600"/>
+              <a:t>Game of skill</a:t>
+            </a:r>
+          </a:p>
+          <a:p>
+            <a:pPr algn="ctr"/>
+            <a:r>
+              <a:rPr lang="en-GB" sz="1600"/>
+              <a:t>Strategy</a:t>
+            </a:r>
+          </a:p>
+          <a:p>
+            <a:pPr algn="ctr"/>
+            <a:r>
+              <a:rPr lang="en-GB" sz="1600"/>
+              <a:t>Fast</a:t>
+            </a:r>
+          </a:p>
+          <a:p>
+            <a:pPr algn="ctr"/>
+            <a:r>
+              <a:rPr lang="en-GB" sz="1600"/>
+              <a:t>Turn based</a:t>
+            </a:r>
+          </a:p>
+          <a:p>
+            <a:pPr algn="ctr"/>
+            <a:r>
+              <a:rPr lang="en-GB" sz="1600"/>
+              <a:t>Simple controls</a:t>
+            </a:r>
+          </a:p>
+        </p:txBody>
+      </p:sp>
     </p:spTree>
     <p:extLst>
       <p:ext uri="{BB962C8B-B14F-4D97-AF65-F5344CB8AC3E}">
@@ -6244,68 +6334,6 @@
           <a:chExt cx="0" cy="0"/>
         </a:xfrm>
       </p:grpSpPr>
-      <p:sp>
-        <p:nvSpPr>
-          <p:cNvPr id="2" name="Title 1"/>
-          <p:cNvSpPr>
-            <a:spLocks noGrp="1"/>
-          </p:cNvSpPr>
-          <p:nvPr>
-            <p:ph type="title"/>
-          </p:nvPr>
-        </p:nvSpPr>
-        <p:spPr/>
-        <p:txBody>
-          <a:bodyPr/>
-          <a:lstStyle/>
-          <a:p>
-            <a:r>
-              <a:rPr lang="en-GB" dirty="0"/>
-              <a:t>Angry Birds</a:t>
-            </a:r>
-          </a:p>
-        </p:txBody>
-      </p:sp>
-      <p:sp>
-        <p:nvSpPr>
-          <p:cNvPr id="3" name="Content Placeholder 2"/>
-          <p:cNvSpPr>
-            <a:spLocks noGrp="1"/>
-          </p:cNvSpPr>
-          <p:nvPr>
-            <p:ph idx="1"/>
-          </p:nvPr>
-        </p:nvSpPr>
-        <p:spPr/>
-        <p:txBody>
-          <a:bodyPr/>
-          <a:lstStyle/>
-          <a:p>
-            <a:r>
-              <a:rPr lang="en-GB" dirty="0"/>
-              <a:t>Trial and Error.</a:t>
-            </a:r>
-          </a:p>
-          <a:p>
-            <a:r>
-              <a:rPr lang="en-GB" dirty="0"/>
-              <a:t>Simple Controls.</a:t>
-            </a:r>
-          </a:p>
-          <a:p>
-            <a:r>
-              <a:rPr lang="en-GB" dirty="0"/>
-              <a:t>Destruction.</a:t>
-            </a:r>
-          </a:p>
-          <a:p>
-            <a:endParaRPr lang="en-GB" dirty="0"/>
-          </a:p>
-          <a:p>
-            <a:endParaRPr lang="en-GB" dirty="0"/>
-          </a:p>
-        </p:txBody>
-      </p:sp>
       <p:pic>
         <p:nvPicPr>
           <p:cNvPr id="4" name="Picture 3"/>
@@ -6314,7 +6342,7 @@
           </p:cNvPicPr>
           <p:nvPr/>
         </p:nvPicPr>
-        <p:blipFill>
+        <p:blipFill rotWithShape="1">
           <a:blip r:embed="rId2">
             <a:extLst>
               <a:ext uri="{28A0092B-C50C-407E-A947-70E740481C1C}">
@@ -6322,20 +6350,109 @@
               </a:ext>
             </a:extLst>
           </a:blip>
-          <a:stretch>
-            <a:fillRect/>
-          </a:stretch>
+          <a:srcRect/>
+          <a:stretch/>
         </p:blipFill>
         <p:spPr>
           <a:xfrm>
-            <a:off x="4112784" y="2556932"/>
-            <a:ext cx="5800412" cy="3267440"/>
+            <a:off x="5418668" y="1890711"/>
+            <a:ext cx="5469466" cy="3076574"/>
           </a:xfrm>
           <a:prstGeom prst="rect">
             <a:avLst/>
           </a:prstGeom>
+          <a:ln w="57150" cmpd="thickThin">
+            <a:solidFill>
+              <a:schemeClr val="tx1">
+                <a:lumMod val="50000"/>
+                <a:lumOff val="50000"/>
+              </a:schemeClr>
+            </a:solidFill>
+            <a:miter lim="800000"/>
+          </a:ln>
         </p:spPr>
       </p:pic>
+      <p:sp>
+        <p:nvSpPr>
+          <p:cNvPr id="2" name="Title 1"/>
+          <p:cNvSpPr>
+            <a:spLocks noGrp="1"/>
+          </p:cNvSpPr>
+          <p:nvPr>
+            <p:ph type="title"/>
+          </p:nvPr>
+        </p:nvSpPr>
+        <p:spPr>
+          <a:xfrm>
+            <a:off x="1295402" y="982132"/>
+            <a:ext cx="3660056" cy="1325373"/>
+          </a:xfrm>
+        </p:spPr>
+        <p:txBody>
+          <a:bodyPr anchor="b">
+            <a:normAutofit/>
+          </a:bodyPr>
+          <a:lstStyle/>
+          <a:p>
+            <a:r>
+              <a:rPr lang="en-GB" sz="2400"/>
+              <a:t>Angry Birds</a:t>
+            </a:r>
+          </a:p>
+        </p:txBody>
+      </p:sp>
+      <p:sp>
+        <p:nvSpPr>
+          <p:cNvPr id="3" name="Content Placeholder 2"/>
+          <p:cNvSpPr>
+            <a:spLocks noGrp="1"/>
+          </p:cNvSpPr>
+          <p:nvPr>
+            <p:ph idx="1"/>
+          </p:nvPr>
+        </p:nvSpPr>
+        <p:spPr>
+          <a:xfrm>
+            <a:off x="1295401" y="2493774"/>
+            <a:ext cx="3660057" cy="3382094"/>
+          </a:xfrm>
+        </p:spPr>
+        <p:txBody>
+          <a:bodyPr>
+            <a:normAutofit/>
+          </a:bodyPr>
+          <a:lstStyle/>
+          <a:p>
+            <a:pPr algn="ctr"/>
+            <a:r>
+              <a:rPr lang="en-GB" sz="1600"/>
+              <a:t>Trial and Error.</a:t>
+            </a:r>
+          </a:p>
+          <a:p>
+            <a:pPr algn="ctr"/>
+            <a:r>
+              <a:rPr lang="en-GB" sz="1600"/>
+              <a:t>Simple Controls.</a:t>
+            </a:r>
+          </a:p>
+          <a:p>
+            <a:pPr algn="ctr"/>
+            <a:r>
+              <a:rPr lang="en-GB" sz="1600"/>
+              <a:t>Destruction.</a:t>
+            </a:r>
+          </a:p>
+          <a:p>
+            <a:pPr algn="ctr"/>
+            <a:endParaRPr lang="en-GB" sz="1600"/>
+          </a:p>
+          <a:p>
+            <a:pPr algn="ctr"/>
+            <a:endParaRPr lang="en-GB" sz="1600"/>
+          </a:p>
+        </p:txBody>
+      </p:sp>
     </p:spTree>
     <p:extLst>
       <p:ext uri="{BB962C8B-B14F-4D97-AF65-F5344CB8AC3E}">
@@ -6366,81 +6483,6 @@
           <a:chExt cx="0" cy="0"/>
         </a:xfrm>
       </p:grpSpPr>
-      <p:sp>
-        <p:nvSpPr>
-          <p:cNvPr id="2" name="Title 1"/>
-          <p:cNvSpPr>
-            <a:spLocks noGrp="1"/>
-          </p:cNvSpPr>
-          <p:nvPr>
-            <p:ph type="title"/>
-          </p:nvPr>
-        </p:nvSpPr>
-        <p:spPr/>
-        <p:txBody>
-          <a:bodyPr/>
-          <a:lstStyle/>
-          <a:p>
-            <a:r>
-              <a:rPr lang="en-GB" dirty="0"/>
-              <a:t>Pocket Tanks</a:t>
-            </a:r>
-          </a:p>
-        </p:txBody>
-      </p:sp>
-      <p:sp>
-        <p:nvSpPr>
-          <p:cNvPr id="3" name="Content Placeholder 2"/>
-          <p:cNvSpPr>
-            <a:spLocks noGrp="1"/>
-          </p:cNvSpPr>
-          <p:nvPr>
-            <p:ph idx="1"/>
-          </p:nvPr>
-        </p:nvSpPr>
-        <p:spPr/>
-        <p:txBody>
-          <a:bodyPr/>
-          <a:lstStyle/>
-          <a:p>
-            <a:r>
-              <a:rPr lang="en-GB" dirty="0"/>
-              <a:t>Customisable weapons = replay ability.</a:t>
-            </a:r>
-          </a:p>
-          <a:p>
-            <a:r>
-              <a:rPr lang="en-GB" dirty="0" err="1"/>
-              <a:t>Destructable</a:t>
-            </a:r>
-            <a:r>
-              <a:rPr lang="en-GB" dirty="0"/>
-              <a:t> terrain.</a:t>
-            </a:r>
-          </a:p>
-          <a:p>
-            <a:r>
-              <a:rPr lang="en-GB" dirty="0"/>
-              <a:t>Easy UI.</a:t>
-            </a:r>
-          </a:p>
-          <a:p>
-            <a:r>
-              <a:rPr lang="en-GB" dirty="0"/>
-              <a:t>Turn Based.</a:t>
-            </a:r>
-          </a:p>
-          <a:p>
-            <a:r>
-              <a:rPr lang="en-GB" dirty="0"/>
-              <a:t>Trial and Error.</a:t>
-            </a:r>
-          </a:p>
-          <a:p>
-            <a:endParaRPr lang="en-GB" dirty="0"/>
-          </a:p>
-        </p:txBody>
-      </p:sp>
       <p:pic>
         <p:nvPicPr>
           <p:cNvPr id="4" name="Picture 3"/>
@@ -6449,7 +6491,7 @@
           </p:cNvPicPr>
           <p:nvPr/>
         </p:nvPicPr>
-        <p:blipFill>
+        <p:blipFill rotWithShape="1">
           <a:blip r:embed="rId2">
             <a:extLst>
               <a:ext uri="{28A0092B-C50C-407E-A947-70E740481C1C}">
@@ -6457,20 +6499,136 @@
               </a:ext>
             </a:extLst>
           </a:blip>
-          <a:stretch>
-            <a:fillRect/>
-          </a:stretch>
+          <a:srcRect/>
+          <a:stretch/>
         </p:blipFill>
         <p:spPr>
           <a:xfrm>
-            <a:off x="4688420" y="3095196"/>
-            <a:ext cx="5878172" cy="2866065"/>
+            <a:off x="5418668" y="2095604"/>
+            <a:ext cx="5469466" cy="2666789"/>
           </a:xfrm>
           <a:prstGeom prst="rect">
             <a:avLst/>
           </a:prstGeom>
+          <a:solidFill>
+            <a:srgbClr val="FFFFFF">
+              <a:shade val="85000"/>
+            </a:srgbClr>
+          </a:solidFill>
+          <a:ln w="57150" cmpd="thickThin">
+            <a:solidFill>
+              <a:schemeClr val="tx1">
+                <a:lumMod val="50000"/>
+                <a:lumOff val="50000"/>
+              </a:schemeClr>
+            </a:solidFill>
+            <a:miter lim="800000"/>
+          </a:ln>
+          <a:scene3d>
+            <a:camera prst="orthographicFront"/>
+            <a:lightRig rig="twoPt" dir="t">
+              <a:rot lat="0" lon="0" rev="7200000"/>
+            </a:lightRig>
+          </a:scene3d>
+          <a:sp3d>
+            <a:bevelT w="25400" h="19050"/>
+            <a:contourClr>
+              <a:srgbClr val="FFFFFF"/>
+            </a:contourClr>
+          </a:sp3d>
         </p:spPr>
       </p:pic>
+      <p:sp>
+        <p:nvSpPr>
+          <p:cNvPr id="2" name="Title 1"/>
+          <p:cNvSpPr>
+            <a:spLocks noGrp="1"/>
+          </p:cNvSpPr>
+          <p:nvPr>
+            <p:ph type="title"/>
+          </p:nvPr>
+        </p:nvSpPr>
+        <p:spPr>
+          <a:xfrm>
+            <a:off x="1295402" y="982132"/>
+            <a:ext cx="3660056" cy="1325373"/>
+          </a:xfrm>
+        </p:spPr>
+        <p:txBody>
+          <a:bodyPr anchor="b">
+            <a:normAutofit/>
+          </a:bodyPr>
+          <a:lstStyle/>
+          <a:p>
+            <a:r>
+              <a:rPr lang="en-GB" sz="2400"/>
+              <a:t>Pocket Tanks</a:t>
+            </a:r>
+          </a:p>
+        </p:txBody>
+      </p:sp>
+      <p:sp>
+        <p:nvSpPr>
+          <p:cNvPr id="3" name="Content Placeholder 2"/>
+          <p:cNvSpPr>
+            <a:spLocks noGrp="1"/>
+          </p:cNvSpPr>
+          <p:nvPr>
+            <p:ph idx="1"/>
+          </p:nvPr>
+        </p:nvSpPr>
+        <p:spPr>
+          <a:xfrm>
+            <a:off x="1295401" y="2493774"/>
+            <a:ext cx="3660057" cy="3382094"/>
+          </a:xfrm>
+        </p:spPr>
+        <p:txBody>
+          <a:bodyPr>
+            <a:normAutofit/>
+          </a:bodyPr>
+          <a:lstStyle/>
+          <a:p>
+            <a:pPr algn="ctr"/>
+            <a:r>
+              <a:rPr lang="en-GB" sz="1600"/>
+              <a:t>Customisable weapons = replay ability.</a:t>
+            </a:r>
+          </a:p>
+          <a:p>
+            <a:pPr algn="ctr"/>
+            <a:r>
+              <a:rPr lang="en-GB" sz="1600"/>
+              <a:t>Destructable terrain.</a:t>
+            </a:r>
+          </a:p>
+          <a:p>
+            <a:pPr algn="ctr"/>
+            <a:r>
+              <a:rPr lang="en-GB" sz="1600"/>
+              <a:t>Easy UI.</a:t>
+            </a:r>
+          </a:p>
+          <a:p>
+            <a:pPr algn="ctr"/>
+            <a:r>
+              <a:rPr lang="en-GB" sz="1600"/>
+              <a:t>Turn Based.</a:t>
+            </a:r>
+          </a:p>
+          <a:p>
+            <a:pPr algn="ctr"/>
+            <a:r>
+              <a:rPr lang="en-GB" sz="1600"/>
+              <a:t>Trial and Error.</a:t>
+            </a:r>
+          </a:p>
+          <a:p>
+            <a:pPr algn="ctr"/>
+            <a:endParaRPr lang="en-GB" sz="1600"/>
+          </a:p>
+        </p:txBody>
+      </p:sp>
     </p:spTree>
     <p:extLst>
       <p:ext uri="{BB962C8B-B14F-4D97-AF65-F5344CB8AC3E}">
@@ -6572,100 +6730,9 @@
           <a:chExt cx="0" cy="0"/>
         </a:xfrm>
       </p:grpSpPr>
-      <p:sp>
-        <p:nvSpPr>
-          <p:cNvPr id="2" name="Title 1"/>
-          <p:cNvSpPr>
-            <a:spLocks noGrp="1"/>
-          </p:cNvSpPr>
-          <p:nvPr>
-            <p:ph type="title"/>
-          </p:nvPr>
-        </p:nvSpPr>
-        <p:spPr/>
-        <p:txBody>
-          <a:bodyPr>
-            <a:normAutofit fontScale="90000"/>
-          </a:bodyPr>
-          <a:lstStyle/>
-          <a:p>
-            <a:r>
-              <a:rPr lang="en-GB" dirty="0"/>
-              <a:t>Bringing it all together</a:t>
-            </a:r>
-            <a:br>
-              <a:rPr lang="en-GB" dirty="0"/>
-            </a:br>
-            <a:r>
-              <a:rPr lang="en-GB" dirty="0"/>
-              <a:t>Elements we want in our Game</a:t>
-            </a:r>
-          </a:p>
-        </p:txBody>
-      </p:sp>
-      <p:sp>
-        <p:nvSpPr>
-          <p:cNvPr id="3" name="Content Placeholder 2"/>
-          <p:cNvSpPr>
-            <a:spLocks noGrp="1"/>
-          </p:cNvSpPr>
-          <p:nvPr>
-            <p:ph idx="1"/>
-          </p:nvPr>
-        </p:nvSpPr>
-        <p:spPr/>
-        <p:txBody>
-          <a:bodyPr/>
-          <a:lstStyle/>
-          <a:p>
-            <a:endParaRPr lang="en-GB" dirty="0"/>
-          </a:p>
-          <a:p>
-            <a:endParaRPr lang="en-GB" dirty="0"/>
-          </a:p>
-          <a:p>
-            <a:r>
-              <a:rPr lang="en-GB" dirty="0"/>
-              <a:t>Trial and Error.</a:t>
-            </a:r>
-          </a:p>
-          <a:p>
-            <a:r>
-              <a:rPr lang="en-GB" dirty="0"/>
-              <a:t>Simple Controls.</a:t>
-            </a:r>
-          </a:p>
-          <a:p>
-            <a:r>
-              <a:rPr lang="en-GB" dirty="0"/>
-              <a:t>Simultaneous play.</a:t>
-            </a:r>
-          </a:p>
-          <a:p>
-            <a:r>
-              <a:rPr lang="en-GB" dirty="0"/>
-              <a:t>Bouncing / </a:t>
-            </a:r>
-            <a:r>
-              <a:rPr lang="en-GB" dirty="0" err="1"/>
-              <a:t>Richochet</a:t>
-            </a:r>
-            <a:r>
-              <a:rPr lang="en-GB" dirty="0"/>
-              <a:t>.</a:t>
-            </a:r>
-          </a:p>
-          <a:p>
-            <a:endParaRPr lang="en-GB" dirty="0"/>
-          </a:p>
-          <a:p>
-            <a:endParaRPr lang="en-GB" dirty="0"/>
-          </a:p>
-        </p:txBody>
-      </p:sp>
       <p:pic>
         <p:nvPicPr>
-          <p:cNvPr id="4" name="Picture 3"/>
+          <p:cNvPr id="5" name="Picture 4"/>
           <p:cNvPicPr>
             <a:picLocks noChangeAspect="1"/>
           </p:cNvPicPr>
@@ -6685,18 +6752,139 @@
         </p:blipFill>
         <p:spPr>
           <a:xfrm>
-            <a:off x="4966618" y="2556932"/>
-            <a:ext cx="5007851" cy="3541461"/>
+            <a:off x="8137325" y="1329350"/>
+            <a:ext cx="2839277" cy="1895217"/>
           </a:xfrm>
           <a:prstGeom prst="rect">
             <a:avLst/>
           </a:prstGeom>
+          <a:ln w="57150" cmpd="thickThin">
+            <a:noFill/>
+            <a:miter lim="800000"/>
+          </a:ln>
         </p:spPr>
       </p:pic>
+      <p:pic>
+        <p:nvPicPr>
+          <p:cNvPr id="4" name="Picture 3"/>
+          <p:cNvPicPr>
+            <a:picLocks noChangeAspect="1"/>
+          </p:cNvPicPr>
+          <p:nvPr/>
+        </p:nvPicPr>
+        <p:blipFill>
+          <a:blip r:embed="rId3">
+            <a:extLst>
+              <a:ext uri="{28A0092B-C50C-407E-A947-70E740481C1C}">
+                <a14:useLocalDpi xmlns:a14="http://schemas.microsoft.com/office/drawing/2010/main" val="0"/>
+              </a:ext>
+            </a:extLst>
+          </a:blip>
+          <a:stretch>
+            <a:fillRect/>
+          </a:stretch>
+        </p:blipFill>
+        <p:spPr>
+          <a:xfrm>
+            <a:off x="8135453" y="3631646"/>
+            <a:ext cx="2843021" cy="1890609"/>
+          </a:xfrm>
+          <a:prstGeom prst="rect">
+            <a:avLst/>
+          </a:prstGeom>
+          <a:ln w="57150" cmpd="thickThin">
+            <a:noFill/>
+            <a:miter lim="800000"/>
+          </a:ln>
+        </p:spPr>
+      </p:pic>
+      <p:sp>
+        <p:nvSpPr>
+          <p:cNvPr id="2" name="Title 1"/>
+          <p:cNvSpPr>
+            <a:spLocks noGrp="1"/>
+          </p:cNvSpPr>
+          <p:nvPr>
+            <p:ph type="title"/>
+          </p:nvPr>
+        </p:nvSpPr>
+        <p:spPr>
+          <a:xfrm>
+            <a:off x="1180101" y="982132"/>
+            <a:ext cx="6354633" cy="1303867"/>
+          </a:xfrm>
+        </p:spPr>
+        <p:txBody>
+          <a:bodyPr>
+            <a:normAutofit/>
+          </a:bodyPr>
+          <a:lstStyle/>
+          <a:p>
+            <a:r>
+              <a:rPr lang="en-GB" dirty="0"/>
+              <a:t>Assembler 3</a:t>
+            </a:r>
+          </a:p>
+        </p:txBody>
+      </p:sp>
+      <p:sp>
+        <p:nvSpPr>
+          <p:cNvPr id="3" name="Content Placeholder 2"/>
+          <p:cNvSpPr>
+            <a:spLocks noGrp="1"/>
+          </p:cNvSpPr>
+          <p:nvPr>
+            <p:ph idx="1"/>
+          </p:nvPr>
+        </p:nvSpPr>
+        <p:spPr>
+          <a:xfrm>
+            <a:off x="1167385" y="2556932"/>
+            <a:ext cx="6380065" cy="3318936"/>
+          </a:xfrm>
+        </p:spPr>
+        <p:txBody>
+          <a:bodyPr>
+            <a:normAutofit/>
+          </a:bodyPr>
+          <a:lstStyle/>
+          <a:p>
+            <a:r>
+              <a:rPr lang="en-GB" dirty="0"/>
+              <a:t>Physics object stacking</a:t>
+            </a:r>
+          </a:p>
+          <a:p>
+            <a:r>
+              <a:rPr lang="en-GB" dirty="0"/>
+              <a:t>Single Player</a:t>
+            </a:r>
+          </a:p>
+          <a:p>
+            <a:r>
+              <a:rPr lang="en-GB" dirty="0"/>
+              <a:t>Minimal UI</a:t>
+            </a:r>
+          </a:p>
+          <a:p>
+            <a:pPr lvl="1"/>
+            <a:r>
+              <a:rPr lang="en-GB" dirty="0"/>
+              <a:t>(no text in latter levels)</a:t>
+            </a:r>
+          </a:p>
+          <a:p>
+            <a:r>
+              <a:rPr lang="en-GB" dirty="0"/>
+              <a:t>Physics crates are fun.</a:t>
+            </a:r>
+          </a:p>
+        </p:txBody>
+      </p:sp>
     </p:spTree>
     <p:extLst>
       <p:ext uri="{BB962C8B-B14F-4D97-AF65-F5344CB8AC3E}">
-        <p14:creationId xmlns:p14="http://schemas.microsoft.com/office/powerpoint/2010/main" val="734466285"/>
+        <p14:creationId xmlns:p14="http://schemas.microsoft.com/office/powerpoint/2010/main" val="2495516911"/>
       </p:ext>
     </p:extLst>
   </p:cSld>
@@ -6735,39 +6923,119 @@
         </p:nvSpPr>
         <p:spPr/>
         <p:txBody>
+          <a:bodyPr>
+            <a:normAutofit fontScale="90000"/>
+          </a:bodyPr>
+          <a:lstStyle/>
+          <a:p>
+            <a:r>
+              <a:rPr lang="en-GB" dirty="0"/>
+              <a:t>Bringing it all together</a:t>
+            </a:r>
+            <a:br>
+              <a:rPr lang="en-GB" dirty="0"/>
+            </a:br>
+            <a:r>
+              <a:rPr lang="en-GB" dirty="0"/>
+              <a:t>Elements we want in our Game</a:t>
+            </a:r>
+          </a:p>
+        </p:txBody>
+      </p:sp>
+      <p:sp>
+        <p:nvSpPr>
+          <p:cNvPr id="3" name="Content Placeholder 2"/>
+          <p:cNvSpPr>
+            <a:spLocks noGrp="1"/>
+          </p:cNvSpPr>
+          <p:nvPr>
+            <p:ph idx="1"/>
+          </p:nvPr>
+        </p:nvSpPr>
+        <p:spPr/>
+        <p:txBody>
           <a:bodyPr/>
           <a:lstStyle/>
           <a:p>
+            <a:endParaRPr lang="en-GB" dirty="0"/>
+          </a:p>
+          <a:p>
+            <a:endParaRPr lang="en-GB" dirty="0"/>
+          </a:p>
+          <a:p>
             <a:r>
               <a:rPr lang="en-GB" dirty="0"/>
-              <a:t>Prototype 1</a:t>
-            </a:r>
-          </a:p>
-        </p:txBody>
-      </p:sp>
-      <p:sp>
-        <p:nvSpPr>
-          <p:cNvPr id="3" name="Content Placeholder 2"/>
-          <p:cNvSpPr>
-            <a:spLocks noGrp="1"/>
-          </p:cNvSpPr>
-          <p:nvPr>
-            <p:ph idx="1"/>
-          </p:nvPr>
-        </p:nvSpPr>
-        <p:spPr/>
-        <p:txBody>
-          <a:bodyPr/>
-          <a:lstStyle/>
-          <a:p>
-            <a:endParaRPr lang="en-GB"/>
-          </a:p>
-        </p:txBody>
-      </p:sp>
+              <a:t>Trial and Error.</a:t>
+            </a:r>
+          </a:p>
+          <a:p>
+            <a:r>
+              <a:rPr lang="en-GB" dirty="0"/>
+              <a:t>Simple Controls.</a:t>
+            </a:r>
+          </a:p>
+          <a:p>
+            <a:r>
+              <a:rPr lang="en-GB" dirty="0"/>
+              <a:t>Simultaneous play.</a:t>
+            </a:r>
+          </a:p>
+          <a:p>
+            <a:r>
+              <a:rPr lang="en-GB" dirty="0"/>
+              <a:t>Bouncing / </a:t>
+            </a:r>
+            <a:r>
+              <a:rPr lang="en-GB" dirty="0" err="1"/>
+              <a:t>Richochet</a:t>
+            </a:r>
+            <a:r>
+              <a:rPr lang="en-GB" dirty="0"/>
+              <a:t>.</a:t>
+            </a:r>
+          </a:p>
+          <a:p>
+            <a:endParaRPr lang="en-GB" dirty="0"/>
+          </a:p>
+          <a:p>
+            <a:endParaRPr lang="en-GB" dirty="0"/>
+          </a:p>
+        </p:txBody>
+      </p:sp>
+      <p:pic>
+        <p:nvPicPr>
+          <p:cNvPr id="4" name="Picture 3"/>
+          <p:cNvPicPr>
+            <a:picLocks noChangeAspect="1"/>
+          </p:cNvPicPr>
+          <p:nvPr/>
+        </p:nvPicPr>
+        <p:blipFill>
+          <a:blip r:embed="rId2">
+            <a:extLst>
+              <a:ext uri="{28A0092B-C50C-407E-A947-70E740481C1C}">
+                <a14:useLocalDpi xmlns:a14="http://schemas.microsoft.com/office/drawing/2010/main" val="0"/>
+              </a:ext>
+            </a:extLst>
+          </a:blip>
+          <a:stretch>
+            <a:fillRect/>
+          </a:stretch>
+        </p:blipFill>
+        <p:spPr>
+          <a:xfrm>
+            <a:off x="4966618" y="2556932"/>
+            <a:ext cx="5007851" cy="3541461"/>
+          </a:xfrm>
+          <a:prstGeom prst="rect">
+            <a:avLst/>
+          </a:prstGeom>
+        </p:spPr>
+      </p:pic>
     </p:spTree>
     <p:extLst>
       <p:ext uri="{BB962C8B-B14F-4D97-AF65-F5344CB8AC3E}">
-        <p14:creationId xmlns:p14="http://schemas.microsoft.com/office/powerpoint/2010/main" val="3958431518"/>
+        <p14:creationId xmlns:p14="http://schemas.microsoft.com/office/powerpoint/2010/main" val="734466285"/>
       </p:ext>
     </p:extLst>
   </p:cSld>
@@ -6794,6 +7062,108 @@
           <a:chExt cx="0" cy="0"/>
         </a:xfrm>
       </p:grpSpPr>
+      <p:pic>
+        <p:nvPicPr>
+          <p:cNvPr id="8" name="Picture 7"/>
+          <p:cNvPicPr>
+            <a:picLocks noChangeAspect="1"/>
+          </p:cNvPicPr>
+          <p:nvPr/>
+        </p:nvPicPr>
+        <p:blipFill rotWithShape="1">
+          <a:blip r:embed="rId2">
+            <a:extLst>
+              <a:ext uri="{28A0092B-C50C-407E-A947-70E740481C1C}">
+                <a14:useLocalDpi xmlns:a14="http://schemas.microsoft.com/office/drawing/2010/main" val="0"/>
+              </a:ext>
+            </a:extLst>
+          </a:blip>
+          <a:srcRect t="8269" b="3036"/>
+          <a:stretch/>
+        </p:blipFill>
+        <p:spPr>
+          <a:xfrm>
+            <a:off x="1257236" y="2654807"/>
+            <a:ext cx="2743200" cy="1399032"/>
+          </a:xfrm>
+          <a:prstGeom prst="rect">
+            <a:avLst/>
+          </a:prstGeom>
+          <a:ln>
+            <a:solidFill>
+              <a:srgbClr val="83992A"/>
+            </a:solidFill>
+          </a:ln>
+        </p:spPr>
+      </p:pic>
+      <p:pic>
+        <p:nvPicPr>
+          <p:cNvPr id="11" name="Content Placeholder 6"/>
+          <p:cNvPicPr>
+            <a:picLocks noChangeAspect="1"/>
+          </p:cNvPicPr>
+          <p:nvPr/>
+        </p:nvPicPr>
+        <p:blipFill rotWithShape="1">
+          <a:blip r:embed="rId3">
+            <a:extLst>
+              <a:ext uri="{28A0092B-C50C-407E-A947-70E740481C1C}">
+                <a14:useLocalDpi xmlns:a14="http://schemas.microsoft.com/office/drawing/2010/main" val="0"/>
+              </a:ext>
+            </a:extLst>
+          </a:blip>
+          <a:srcRect t="5907" b="5398"/>
+          <a:stretch/>
+        </p:blipFill>
+        <p:spPr>
+          <a:xfrm>
+            <a:off x="1257236" y="1255776"/>
+            <a:ext cx="2743200" cy="1399032"/>
+          </a:xfrm>
+          <a:prstGeom prst="rect">
+            <a:avLst/>
+          </a:prstGeom>
+          <a:ln>
+            <a:solidFill>
+              <a:srgbClr val="83992A"/>
+            </a:solidFill>
+          </a:ln>
+        </p:spPr>
+      </p:pic>
+      <p:pic>
+        <p:nvPicPr>
+          <p:cNvPr id="9" name="Picture 8"/>
+          <p:cNvPicPr>
+            <a:picLocks noChangeAspect="1"/>
+          </p:cNvPicPr>
+          <p:nvPr/>
+        </p:nvPicPr>
+        <p:blipFill rotWithShape="1">
+          <a:blip r:embed="rId4">
+            <a:extLst>
+              <a:ext uri="{28A0092B-C50C-407E-A947-70E740481C1C}">
+                <a14:useLocalDpi xmlns:a14="http://schemas.microsoft.com/office/drawing/2010/main" val="0"/>
+              </a:ext>
+            </a:extLst>
+          </a:blip>
+          <a:srcRect t="5912" b="5393"/>
+          <a:stretch/>
+        </p:blipFill>
+        <p:spPr>
+          <a:xfrm>
+            <a:off x="1257236" y="4053839"/>
+            <a:ext cx="2743200" cy="1399032"/>
+          </a:xfrm>
+          <a:prstGeom prst="rect">
+            <a:avLst/>
+          </a:prstGeom>
+          <a:ln>
+            <a:solidFill>
+              <a:srgbClr val="83992A"/>
+            </a:solidFill>
+          </a:ln>
+        </p:spPr>
+      </p:pic>
       <p:sp>
         <p:nvSpPr>
           <p:cNvPr id="2" name="Title 1"/>
@@ -6804,21 +7174,34 @@
             <p:ph type="title"/>
           </p:nvPr>
         </p:nvSpPr>
-        <p:spPr/>
-        <p:txBody>
-          <a:bodyPr/>
-          <a:lstStyle/>
-          <a:p>
+        <p:spPr>
+          <a:xfrm>
+            <a:off x="4626508" y="982132"/>
+            <a:ext cx="6270090" cy="1303867"/>
+          </a:xfrm>
+        </p:spPr>
+        <p:txBody>
+          <a:bodyPr>
+            <a:normAutofit/>
+          </a:bodyPr>
+          <a:lstStyle/>
+          <a:p>
+            <a:pPr>
+              <a:lnSpc>
+                <a:spcPct val="90000"/>
+              </a:lnSpc>
+            </a:pPr>
             <a:r>
               <a:rPr lang="en-GB" dirty="0"/>
-              <a:t>Prototype 2</a:t>
-            </a:r>
-          </a:p>
-        </p:txBody>
-      </p:sp>
-      <p:sp>
-        <p:nvSpPr>
-          <p:cNvPr id="3" name="Content Placeholder 2"/>
+              <a:t>Prototype 1: Orbital Gravity</a:t>
+            </a:r>
+            <a:endParaRPr lang="en-GB"/>
+          </a:p>
+        </p:txBody>
+      </p:sp>
+      <p:sp>
+        <p:nvSpPr>
+          <p:cNvPr id="13" name="Content Placeholder 12"/>
           <p:cNvSpPr>
             <a:spLocks noGrp="1"/>
           </p:cNvSpPr>
@@ -6826,19 +7209,43 @@
             <p:ph idx="1"/>
           </p:nvPr>
         </p:nvSpPr>
-        <p:spPr/>
-        <p:txBody>
-          <a:bodyPr/>
-          <a:lstStyle/>
-          <a:p>
-            <a:endParaRPr lang="en-GB"/>
+        <p:spPr>
+          <a:xfrm>
+            <a:off x="4631496" y="2556932"/>
+            <a:ext cx="6260114" cy="3318936"/>
+          </a:xfrm>
+        </p:spPr>
+        <p:txBody>
+          <a:bodyPr>
+            <a:normAutofit/>
+          </a:bodyPr>
+          <a:lstStyle/>
+          <a:p>
+            <a:r>
+              <a:rPr lang="en-US" sz="2000" dirty="0"/>
+              <a:t>Mix between Tanks and </a:t>
+            </a:r>
+            <a:r>
+              <a:rPr lang="en-US" sz="2000" dirty="0" err="1"/>
+              <a:t>Kerbal</a:t>
+            </a:r>
+            <a:r>
+              <a:rPr lang="en-US" sz="2000" dirty="0"/>
+              <a:t> Space Program</a:t>
+            </a:r>
+          </a:p>
+          <a:p>
+            <a:r>
+              <a:rPr lang="en-US" sz="2000" dirty="0"/>
+              <a:t>Mobile Game</a:t>
+            </a:r>
           </a:p>
         </p:txBody>
       </p:sp>
     </p:spTree>
     <p:extLst>
       <p:ext uri="{BB962C8B-B14F-4D97-AF65-F5344CB8AC3E}">
-        <p14:creationId xmlns:p14="http://schemas.microsoft.com/office/powerpoint/2010/main" val="1301525453"/>
+        <p14:creationId xmlns:p14="http://schemas.microsoft.com/office/powerpoint/2010/main" val="3958431518"/>
       </p:ext>
     </p:extLst>
   </p:cSld>
@@ -6882,7 +7289,7 @@
           <a:p>
             <a:r>
               <a:rPr lang="en-GB" dirty="0"/>
-              <a:t>Prototype 3</a:t>
+              <a:t>Prototype 2</a:t>
             </a:r>
           </a:p>
         </p:txBody>
@@ -6909,7 +7316,7 @@
     </p:spTree>
     <p:extLst>
       <p:ext uri="{BB962C8B-B14F-4D97-AF65-F5344CB8AC3E}">
-        <p14:creationId xmlns:p14="http://schemas.microsoft.com/office/powerpoint/2010/main" val="1402690200"/>
+        <p14:creationId xmlns:p14="http://schemas.microsoft.com/office/powerpoint/2010/main" val="1301525453"/>
       </p:ext>
     </p:extLst>
   </p:cSld>

</xml_diff>

<commit_message>
Stacking Prototype slide on presentation
</commit_message>
<xml_diff>
--- a/docs/presentation/Adversarial Physics.pptx
+++ b/docs/presentation/Adversarial Physics.pptx
@@ -2,7 +2,7 @@
 <file path=ppt/presentation.xml><?xml version="1.0" encoding="utf-8"?>
 <p:presentation xmlns:a="http://schemas.openxmlformats.org/drawingml/2006/main" xmlns:r="http://schemas.openxmlformats.org/officeDocument/2006/relationships" xmlns:p="http://schemas.openxmlformats.org/presentationml/2006/main" saveSubsetFonts="1">
   <p:sldMasterIdLst>
-    <p:sldMasterId id="2147483678" r:id="rId1"/>
+    <p:sldMasterId id="2147483732" r:id="rId1"/>
   </p:sldMasterIdLst>
   <p:sldIdLst>
     <p:sldId id="256" r:id="rId2"/>
@@ -545,7 +545,7 @@
     </p:spTree>
     <p:extLst>
       <p:ext uri="{BB962C8B-B14F-4D97-AF65-F5344CB8AC3E}">
-        <p14:creationId xmlns:p14="http://schemas.microsoft.com/office/powerpoint/2010/main" val="1778306858"/>
+        <p14:creationId xmlns:p14="http://schemas.microsoft.com/office/powerpoint/2010/main" val="2181510089"/>
       </p:ext>
     </p:extLst>
   </p:cSld>
@@ -829,7 +829,7 @@
     </p:spTree>
     <p:extLst>
       <p:ext uri="{BB962C8B-B14F-4D97-AF65-F5344CB8AC3E}">
-        <p14:creationId xmlns:p14="http://schemas.microsoft.com/office/powerpoint/2010/main" val="2859093424"/>
+        <p14:creationId xmlns:p14="http://schemas.microsoft.com/office/powerpoint/2010/main" val="1263523014"/>
       </p:ext>
     </p:extLst>
   </p:cSld>
@@ -1108,7 +1108,7 @@
     </p:spTree>
     <p:extLst>
       <p:ext uri="{BB962C8B-B14F-4D97-AF65-F5344CB8AC3E}">
-        <p14:creationId xmlns:p14="http://schemas.microsoft.com/office/powerpoint/2010/main" val="3160051447"/>
+        <p14:creationId xmlns:p14="http://schemas.microsoft.com/office/powerpoint/2010/main" val="1481348369"/>
       </p:ext>
     </p:extLst>
   </p:cSld>
@@ -1515,7 +1515,7 @@
     </p:spTree>
     <p:extLst>
       <p:ext uri="{BB962C8B-B14F-4D97-AF65-F5344CB8AC3E}">
-        <p14:creationId xmlns:p14="http://schemas.microsoft.com/office/powerpoint/2010/main" val="96309058"/>
+        <p14:creationId xmlns:p14="http://schemas.microsoft.com/office/powerpoint/2010/main" val="1845589012"/>
       </p:ext>
     </p:extLst>
   </p:cSld>
@@ -1763,7 +1763,7 @@
     </p:spTree>
     <p:extLst>
       <p:ext uri="{BB962C8B-B14F-4D97-AF65-F5344CB8AC3E}">
-        <p14:creationId xmlns:p14="http://schemas.microsoft.com/office/powerpoint/2010/main" val="2886915491"/>
+        <p14:creationId xmlns:p14="http://schemas.microsoft.com/office/powerpoint/2010/main" val="3765689915"/>
       </p:ext>
     </p:extLst>
   </p:cSld>
@@ -2236,7 +2236,7 @@
     </p:spTree>
     <p:extLst>
       <p:ext uri="{BB962C8B-B14F-4D97-AF65-F5344CB8AC3E}">
-        <p14:creationId xmlns:p14="http://schemas.microsoft.com/office/powerpoint/2010/main" val="314685201"/>
+        <p14:creationId xmlns:p14="http://schemas.microsoft.com/office/powerpoint/2010/main" val="3073913828"/>
       </p:ext>
     </p:extLst>
   </p:cSld>
@@ -2638,7 +2638,7 @@
     </p:spTree>
     <p:extLst>
       <p:ext uri="{BB962C8B-B14F-4D97-AF65-F5344CB8AC3E}">
-        <p14:creationId xmlns:p14="http://schemas.microsoft.com/office/powerpoint/2010/main" val="1302123249"/>
+        <p14:creationId xmlns:p14="http://schemas.microsoft.com/office/powerpoint/2010/main" val="1424643279"/>
       </p:ext>
     </p:extLst>
   </p:cSld>
@@ -2843,7 +2843,7 @@
     </p:spTree>
     <p:extLst>
       <p:ext uri="{BB962C8B-B14F-4D97-AF65-F5344CB8AC3E}">
-        <p14:creationId xmlns:p14="http://schemas.microsoft.com/office/powerpoint/2010/main" val="1345231066"/>
+        <p14:creationId xmlns:p14="http://schemas.microsoft.com/office/powerpoint/2010/main" val="1899011058"/>
       </p:ext>
     </p:extLst>
   </p:cSld>
@@ -3054,7 +3054,7 @@
     </p:spTree>
     <p:extLst>
       <p:ext uri="{BB962C8B-B14F-4D97-AF65-F5344CB8AC3E}">
-        <p14:creationId xmlns:p14="http://schemas.microsoft.com/office/powerpoint/2010/main" val="3608400837"/>
+        <p14:creationId xmlns:p14="http://schemas.microsoft.com/office/powerpoint/2010/main" val="3588031121"/>
       </p:ext>
     </p:extLst>
   </p:cSld>
@@ -3255,7 +3255,7 @@
     </p:spTree>
     <p:extLst>
       <p:ext uri="{BB962C8B-B14F-4D97-AF65-F5344CB8AC3E}">
-        <p14:creationId xmlns:p14="http://schemas.microsoft.com/office/powerpoint/2010/main" val="2100455203"/>
+        <p14:creationId xmlns:p14="http://schemas.microsoft.com/office/powerpoint/2010/main" val="2281390643"/>
       </p:ext>
     </p:extLst>
   </p:cSld>
@@ -3534,7 +3534,7 @@
     </p:spTree>
     <p:extLst>
       <p:ext uri="{BB962C8B-B14F-4D97-AF65-F5344CB8AC3E}">
-        <p14:creationId xmlns:p14="http://schemas.microsoft.com/office/powerpoint/2010/main" val="941569122"/>
+        <p14:creationId xmlns:p14="http://schemas.microsoft.com/office/powerpoint/2010/main" val="298003994"/>
       </p:ext>
     </p:extLst>
   </p:cSld>
@@ -3801,7 +3801,7 @@
     </p:spTree>
     <p:extLst>
       <p:ext uri="{BB962C8B-B14F-4D97-AF65-F5344CB8AC3E}">
-        <p14:creationId xmlns:p14="http://schemas.microsoft.com/office/powerpoint/2010/main" val="1536736093"/>
+        <p14:creationId xmlns:p14="http://schemas.microsoft.com/office/powerpoint/2010/main" val="623438868"/>
       </p:ext>
     </p:extLst>
   </p:cSld>
@@ -4226,7 +4226,7 @@
     </p:spTree>
     <p:extLst>
       <p:ext uri="{BB962C8B-B14F-4D97-AF65-F5344CB8AC3E}">
-        <p14:creationId xmlns:p14="http://schemas.microsoft.com/office/powerpoint/2010/main" val="1153363616"/>
+        <p14:creationId xmlns:p14="http://schemas.microsoft.com/office/powerpoint/2010/main" val="1173110324"/>
       </p:ext>
     </p:extLst>
   </p:cSld>
@@ -4375,7 +4375,7 @@
     </p:spTree>
     <p:extLst>
       <p:ext uri="{BB962C8B-B14F-4D97-AF65-F5344CB8AC3E}">
-        <p14:creationId xmlns:p14="http://schemas.microsoft.com/office/powerpoint/2010/main" val="413016396"/>
+        <p14:creationId xmlns:p14="http://schemas.microsoft.com/office/powerpoint/2010/main" val="1060352400"/>
       </p:ext>
     </p:extLst>
   </p:cSld>
@@ -4470,7 +4470,7 @@
     </p:spTree>
     <p:extLst>
       <p:ext uri="{BB962C8B-B14F-4D97-AF65-F5344CB8AC3E}">
-        <p14:creationId xmlns:p14="http://schemas.microsoft.com/office/powerpoint/2010/main" val="2810171507"/>
+        <p14:creationId xmlns:p14="http://schemas.microsoft.com/office/powerpoint/2010/main" val="869646685"/>
       </p:ext>
     </p:extLst>
   </p:cSld>
@@ -4756,7 +4756,7 @@
     </p:spTree>
     <p:extLst>
       <p:ext uri="{BB962C8B-B14F-4D97-AF65-F5344CB8AC3E}">
-        <p14:creationId xmlns:p14="http://schemas.microsoft.com/office/powerpoint/2010/main" val="1919135842"/>
+        <p14:creationId xmlns:p14="http://schemas.microsoft.com/office/powerpoint/2010/main" val="2880108913"/>
       </p:ext>
     </p:extLst>
   </p:cSld>
@@ -5040,7 +5040,7 @@
     </p:spTree>
     <p:extLst>
       <p:ext uri="{BB962C8B-B14F-4D97-AF65-F5344CB8AC3E}">
-        <p14:creationId xmlns:p14="http://schemas.microsoft.com/office/powerpoint/2010/main" val="1688670229"/>
+        <p14:creationId xmlns:p14="http://schemas.microsoft.com/office/powerpoint/2010/main" val="388928203"/>
       </p:ext>
     </p:extLst>
   </p:cSld>
@@ -5427,29 +5427,29 @@
     </p:spTree>
     <p:extLst>
       <p:ext uri="{BB962C8B-B14F-4D97-AF65-F5344CB8AC3E}">
-        <p14:creationId xmlns:p14="http://schemas.microsoft.com/office/powerpoint/2010/main" val="760300317"/>
+        <p14:creationId xmlns:p14="http://schemas.microsoft.com/office/powerpoint/2010/main" val="1484851459"/>
       </p:ext>
     </p:extLst>
   </p:cSld>
   <p:clrMap bg1="lt1" tx1="dk1" bg2="lt2" tx2="dk2" accent1="accent1" accent2="accent2" accent3="accent3" accent4="accent4" accent5="accent5" accent6="accent6" hlink="hlink" folHlink="folHlink"/>
   <p:sldLayoutIdLst>
-    <p:sldLayoutId id="2147483679" r:id="rId1"/>
-    <p:sldLayoutId id="2147483680" r:id="rId2"/>
-    <p:sldLayoutId id="2147483681" r:id="rId3"/>
-    <p:sldLayoutId id="2147483682" r:id="rId4"/>
-    <p:sldLayoutId id="2147483683" r:id="rId5"/>
-    <p:sldLayoutId id="2147483684" r:id="rId6"/>
-    <p:sldLayoutId id="2147483685" r:id="rId7"/>
-    <p:sldLayoutId id="2147483686" r:id="rId8"/>
-    <p:sldLayoutId id="2147483687" r:id="rId9"/>
-    <p:sldLayoutId id="2147483688" r:id="rId10"/>
-    <p:sldLayoutId id="2147483689" r:id="rId11"/>
-    <p:sldLayoutId id="2147483690" r:id="rId12"/>
-    <p:sldLayoutId id="2147483691" r:id="rId13"/>
-    <p:sldLayoutId id="2147483692" r:id="rId14"/>
-    <p:sldLayoutId id="2147483693" r:id="rId15"/>
-    <p:sldLayoutId id="2147483694" r:id="rId16"/>
-    <p:sldLayoutId id="2147483695" r:id="rId17"/>
+    <p:sldLayoutId id="2147483733" r:id="rId1"/>
+    <p:sldLayoutId id="2147483734" r:id="rId2"/>
+    <p:sldLayoutId id="2147483735" r:id="rId3"/>
+    <p:sldLayoutId id="2147483736" r:id="rId4"/>
+    <p:sldLayoutId id="2147483737" r:id="rId5"/>
+    <p:sldLayoutId id="2147483738" r:id="rId6"/>
+    <p:sldLayoutId id="2147483739" r:id="rId7"/>
+    <p:sldLayoutId id="2147483740" r:id="rId8"/>
+    <p:sldLayoutId id="2147483741" r:id="rId9"/>
+    <p:sldLayoutId id="2147483742" r:id="rId10"/>
+    <p:sldLayoutId id="2147483743" r:id="rId11"/>
+    <p:sldLayoutId id="2147483744" r:id="rId12"/>
+    <p:sldLayoutId id="2147483745" r:id="rId13"/>
+    <p:sldLayoutId id="2147483746" r:id="rId14"/>
+    <p:sldLayoutId id="2147483747" r:id="rId15"/>
+    <p:sldLayoutId id="2147483748" r:id="rId16"/>
+    <p:sldLayoutId id="2147483749" r:id="rId17"/>
   </p:sldLayoutIdLst>
   <p:txStyles>
     <p:titleStyle>
@@ -6250,55 +6250,53 @@
         </p:spPr>
         <p:txBody>
           <a:bodyPr>
-            <a:normAutofit/>
+            <a:noAutofit/>
           </a:bodyPr>
           <a:lstStyle/>
           <a:p>
-            <a:pPr algn="ctr"/>
-            <a:r>
-              <a:rPr lang="en-GB" sz="1600"/>
+            <a:r>
+              <a:rPr lang="en-GB" dirty="0"/>
               <a:t>Trial and error</a:t>
             </a:r>
           </a:p>
           <a:p>
-            <a:pPr algn="ctr"/>
-            <a:r>
-              <a:rPr lang="en-GB" sz="1600"/>
-              <a:t>Bouncing/ Richocet</a:t>
-            </a:r>
-          </a:p>
-          <a:p>
-            <a:pPr algn="ctr"/>
-            <a:r>
-              <a:rPr lang="en-GB" sz="1600"/>
+            <a:r>
+              <a:rPr lang="en-GB" dirty="0"/>
+              <a:t>Bouncing/ </a:t>
+            </a:r>
+            <a:r>
+              <a:rPr lang="en-GB" dirty="0" err="1"/>
+              <a:t>Richocet</a:t>
+            </a:r>
+            <a:endParaRPr lang="en-GB" dirty="0"/>
+          </a:p>
+          <a:p>
+            <a:r>
+              <a:rPr lang="en-GB" dirty="0"/>
               <a:t>Game of skill</a:t>
             </a:r>
           </a:p>
           <a:p>
-            <a:pPr algn="ctr"/>
-            <a:r>
-              <a:rPr lang="en-GB" sz="1600"/>
+            <a:r>
+              <a:rPr lang="en-GB" dirty="0"/>
               <a:t>Strategy</a:t>
             </a:r>
           </a:p>
           <a:p>
-            <a:pPr algn="ctr"/>
-            <a:r>
-              <a:rPr lang="en-GB" sz="1600"/>
+            <a:r>
+              <a:rPr lang="en-GB" dirty="0"/>
               <a:t>Fast</a:t>
             </a:r>
           </a:p>
           <a:p>
-            <a:pPr algn="ctr"/>
-            <a:r>
-              <a:rPr lang="en-GB" sz="1600"/>
+            <a:r>
+              <a:rPr lang="en-GB" dirty="0"/>
               <a:t>Turn based</a:t>
             </a:r>
           </a:p>
           <a:p>
-            <a:pPr algn="ctr"/>
-            <a:r>
-              <a:rPr lang="en-GB" sz="1600"/>
+            <a:r>
+              <a:rPr lang="en-GB" dirty="0"/>
               <a:t>Simple controls</a:t>
             </a:r>
           </a:p>
@@ -6423,33 +6421,30 @@
           </a:bodyPr>
           <a:lstStyle/>
           <a:p>
+            <a:r>
+              <a:rPr lang="en-GB" dirty="0"/>
+              <a:t>Trial and Error.</a:t>
+            </a:r>
+          </a:p>
+          <a:p>
+            <a:r>
+              <a:rPr lang="en-GB" dirty="0"/>
+              <a:t>Simple Controls.</a:t>
+            </a:r>
+          </a:p>
+          <a:p>
+            <a:r>
+              <a:rPr lang="en-GB" dirty="0"/>
+              <a:t>Destruction.</a:t>
+            </a:r>
+          </a:p>
+          <a:p>
             <a:pPr algn="ctr"/>
-            <a:r>
-              <a:rPr lang="en-GB" sz="1600"/>
-              <a:t>Trial and Error.</a:t>
-            </a:r>
+            <a:endParaRPr lang="en-GB" sz="1600" dirty="0"/>
           </a:p>
           <a:p>
             <a:pPr algn="ctr"/>
-            <a:r>
-              <a:rPr lang="en-GB" sz="1600"/>
-              <a:t>Simple Controls.</a:t>
-            </a:r>
-          </a:p>
-          <a:p>
-            <a:pPr algn="ctr"/>
-            <a:r>
-              <a:rPr lang="en-GB" sz="1600"/>
-              <a:t>Destruction.</a:t>
-            </a:r>
-          </a:p>
-          <a:p>
-            <a:pPr algn="ctr"/>
-            <a:endParaRPr lang="en-GB" sz="1600"/>
-          </a:p>
-          <a:p>
-            <a:pPr algn="ctr"/>
-            <a:endParaRPr lang="en-GB" sz="1600"/>
+            <a:endParaRPr lang="en-GB" sz="1600" dirty="0"/>
           </a:p>
         </p:txBody>
       </p:sp>
@@ -6589,43 +6584,49 @@
           </a:bodyPr>
           <a:lstStyle/>
           <a:p>
+            <a:r>
+              <a:rPr lang="en-GB" dirty="0"/>
+              <a:t>Customisable weapons</a:t>
+            </a:r>
+          </a:p>
+          <a:p>
+            <a:pPr lvl="1"/>
+            <a:r>
+              <a:rPr lang="en-GB" dirty="0" err="1"/>
+              <a:t>Replayability</a:t>
+            </a:r>
+            <a:r>
+              <a:rPr lang="en-GB" dirty="0"/>
+              <a:t>.</a:t>
+            </a:r>
+          </a:p>
+          <a:p>
+            <a:r>
+              <a:rPr lang="en-GB" dirty="0"/>
+              <a:t>Destructible terrain.</a:t>
+            </a:r>
+          </a:p>
+          <a:p>
+            <a:r>
+              <a:rPr lang="en-GB" dirty="0"/>
+              <a:t>Easy UI.</a:t>
+            </a:r>
+          </a:p>
+          <a:p>
+            <a:r>
+              <a:rPr lang="en-GB" dirty="0"/>
+              <a:t>Turn Based.</a:t>
+            </a:r>
+          </a:p>
+          <a:p>
+            <a:r>
+              <a:rPr lang="en-GB" dirty="0"/>
+              <a:t>Trial and Error.</a:t>
+            </a:r>
+          </a:p>
+          <a:p>
             <a:pPr algn="ctr"/>
-            <a:r>
-              <a:rPr lang="en-GB" sz="1600"/>
-              <a:t>Customisable weapons = replay ability.</a:t>
-            </a:r>
-          </a:p>
-          <a:p>
-            <a:pPr algn="ctr"/>
-            <a:r>
-              <a:rPr lang="en-GB" sz="1600"/>
-              <a:t>Destructable terrain.</a:t>
-            </a:r>
-          </a:p>
-          <a:p>
-            <a:pPr algn="ctr"/>
-            <a:r>
-              <a:rPr lang="en-GB" sz="1600"/>
-              <a:t>Easy UI.</a:t>
-            </a:r>
-          </a:p>
-          <a:p>
-            <a:pPr algn="ctr"/>
-            <a:r>
-              <a:rPr lang="en-GB" sz="1600"/>
-              <a:t>Turn Based.</a:t>
-            </a:r>
-          </a:p>
-          <a:p>
-            <a:pPr algn="ctr"/>
-            <a:r>
-              <a:rPr lang="en-GB" sz="1600"/>
-              <a:t>Trial and Error.</a:t>
-            </a:r>
-          </a:p>
-          <a:p>
-            <a:pPr algn="ctr"/>
-            <a:endParaRPr lang="en-GB" sz="1600"/>
+            <a:endParaRPr lang="en-GB" sz="1600" dirty="0"/>
           </a:p>
         </p:txBody>
       </p:sp>
@@ -7222,22 +7223,28 @@
           <a:lstStyle/>
           <a:p>
             <a:r>
-              <a:rPr lang="en-US" sz="2000" dirty="0"/>
+              <a:rPr lang="en-US" dirty="0"/>
               <a:t>Mix between Tanks and </a:t>
             </a:r>
             <a:r>
-              <a:rPr lang="en-US" sz="2000" dirty="0" err="1"/>
+              <a:rPr lang="en-US" dirty="0" err="1"/>
               <a:t>Kerbal</a:t>
             </a:r>
             <a:r>
-              <a:rPr lang="en-US" sz="2000" dirty="0"/>
+              <a:rPr lang="en-US" dirty="0"/>
               <a:t> Space Program</a:t>
             </a:r>
           </a:p>
           <a:p>
             <a:r>
-              <a:rPr lang="en-US" sz="2000" dirty="0"/>
+              <a:rPr lang="en-US" dirty="0"/>
               <a:t>Mobile Game</a:t>
+            </a:r>
+          </a:p>
+          <a:p>
+            <a:r>
+              <a:rPr lang="en-US" dirty="0"/>
+              <a:t>Player Skill</a:t>
             </a:r>
           </a:p>
         </p:txBody>
@@ -7282,21 +7289,28 @@
             <p:ph type="title"/>
           </p:nvPr>
         </p:nvSpPr>
-        <p:spPr/>
-        <p:txBody>
-          <a:bodyPr/>
+        <p:spPr>
+          <a:xfrm>
+            <a:off x="1250491" y="982132"/>
+            <a:ext cx="4842190" cy="1461523"/>
+          </a:xfrm>
+        </p:spPr>
+        <p:txBody>
+          <a:bodyPr anchor="b">
+            <a:normAutofit/>
+          </a:bodyPr>
           <a:lstStyle/>
           <a:p>
             <a:r>
               <a:rPr lang="en-GB" dirty="0"/>
-              <a:t>Prototype 2</a:t>
-            </a:r>
-          </a:p>
-        </p:txBody>
-      </p:sp>
-      <p:sp>
-        <p:nvSpPr>
-          <p:cNvPr id="3" name="Content Placeholder 2"/>
+              <a:t>Prototype 2: Crate Stacking</a:t>
+            </a:r>
+          </a:p>
+        </p:txBody>
+      </p:sp>
+      <p:sp>
+        <p:nvSpPr>
+          <p:cNvPr id="10" name="Content Placeholder 9"/>
           <p:cNvSpPr>
             <a:spLocks noGrp="1"/>
           </p:cNvSpPr>
@@ -7304,15 +7318,145 @@
             <p:ph idx="1"/>
           </p:nvPr>
         </p:nvSpPr>
-        <p:spPr/>
-        <p:txBody>
-          <a:bodyPr/>
-          <a:lstStyle/>
-          <a:p>
-            <a:endParaRPr lang="en-GB"/>
-          </a:p>
-        </p:txBody>
-      </p:sp>
+        <p:spPr>
+          <a:xfrm>
+            <a:off x="1250491" y="2498742"/>
+            <a:ext cx="4528947" cy="3421291"/>
+          </a:xfrm>
+        </p:spPr>
+        <p:txBody>
+          <a:bodyPr>
+            <a:normAutofit/>
+          </a:bodyPr>
+          <a:lstStyle/>
+          <a:p>
+            <a:r>
+              <a:rPr lang="en-US" dirty="0"/>
+              <a:t>Players build towers</a:t>
+            </a:r>
+          </a:p>
+          <a:p>
+            <a:r>
+              <a:rPr lang="en-US" dirty="0"/>
+              <a:t>First to build a certain height wins</a:t>
+            </a:r>
+          </a:p>
+          <a:p>
+            <a:r>
+              <a:rPr lang="en-US" dirty="0"/>
+              <a:t>Split-screen</a:t>
+            </a:r>
+          </a:p>
+          <a:p>
+            <a:r>
+              <a:rPr lang="en-US" dirty="0"/>
+              <a:t>Mobile/Touchscreen</a:t>
+            </a:r>
+          </a:p>
+        </p:txBody>
+      </p:sp>
+      <p:pic>
+        <p:nvPicPr>
+          <p:cNvPr id="21" name="Content Placeholder 3"/>
+          <p:cNvPicPr>
+            <a:picLocks noChangeAspect="1"/>
+          </p:cNvPicPr>
+          <p:nvPr/>
+        </p:nvPicPr>
+        <p:blipFill>
+          <a:blip r:embed="rId2">
+            <a:extLst>
+              <a:ext uri="{28A0092B-C50C-407E-A947-70E740481C1C}">
+                <a14:useLocalDpi xmlns:a14="http://schemas.microsoft.com/office/drawing/2010/main" val="0"/>
+              </a:ext>
+            </a:extLst>
+          </a:blip>
+          <a:stretch>
+            <a:fillRect/>
+          </a:stretch>
+        </p:blipFill>
+        <p:spPr>
+          <a:xfrm>
+            <a:off x="6092681" y="2637077"/>
+            <a:ext cx="1434372" cy="2988276"/>
+          </a:xfrm>
+          <a:prstGeom prst="rect">
+            <a:avLst/>
+          </a:prstGeom>
+          <a:ln w="57150" cmpd="thickThin">
+            <a:noFill/>
+            <a:miter lim="800000"/>
+          </a:ln>
+        </p:spPr>
+      </p:pic>
+      <p:pic>
+        <p:nvPicPr>
+          <p:cNvPr id="22" name="Picture 21"/>
+          <p:cNvPicPr>
+            <a:picLocks noChangeAspect="1"/>
+          </p:cNvPicPr>
+          <p:nvPr/>
+        </p:nvPicPr>
+        <p:blipFill>
+          <a:blip r:embed="rId3">
+            <a:extLst>
+              <a:ext uri="{28A0092B-C50C-407E-A947-70E740481C1C}">
+                <a14:useLocalDpi xmlns:a14="http://schemas.microsoft.com/office/drawing/2010/main" val="0"/>
+              </a:ext>
+            </a:extLst>
+          </a:blip>
+          <a:stretch>
+            <a:fillRect/>
+          </a:stretch>
+        </p:blipFill>
+        <p:spPr>
+          <a:xfrm>
+            <a:off x="7703960" y="2637077"/>
+            <a:ext cx="1434372" cy="2988276"/>
+          </a:xfrm>
+          <a:prstGeom prst="rect">
+            <a:avLst/>
+          </a:prstGeom>
+          <a:ln w="57150" cmpd="thickThin">
+            <a:noFill/>
+            <a:miter lim="800000"/>
+          </a:ln>
+        </p:spPr>
+      </p:pic>
+      <p:pic>
+        <p:nvPicPr>
+          <p:cNvPr id="23" name="Picture 22"/>
+          <p:cNvPicPr>
+            <a:picLocks noChangeAspect="1"/>
+          </p:cNvPicPr>
+          <p:nvPr/>
+        </p:nvPicPr>
+        <p:blipFill>
+          <a:blip r:embed="rId4">
+            <a:extLst>
+              <a:ext uri="{28A0092B-C50C-407E-A947-70E740481C1C}">
+                <a14:useLocalDpi xmlns:a14="http://schemas.microsoft.com/office/drawing/2010/main" val="0"/>
+              </a:ext>
+            </a:extLst>
+          </a:blip>
+          <a:stretch>
+            <a:fillRect/>
+          </a:stretch>
+        </p:blipFill>
+        <p:spPr>
+          <a:xfrm>
+            <a:off x="9321896" y="2637077"/>
+            <a:ext cx="1434372" cy="2988276"/>
+          </a:xfrm>
+          <a:prstGeom prst="rect">
+            <a:avLst/>
+          </a:prstGeom>
+          <a:ln w="57150" cmpd="thickThin">
+            <a:noFill/>
+            <a:miter lim="800000"/>
+          </a:ln>
+        </p:spPr>
+      </p:pic>
     </p:spTree>
     <p:extLst>
       <p:ext uri="{BB962C8B-B14F-4D97-AF65-F5344CB8AC3E}">

</xml_diff>